<commit_message>
Updates at the end of Sprint 16
</commit_message>
<xml_diff>
--- a/Agile_Docs/Retro - Sprint 15.pptx
+++ b/Agile_Docs/Retro - Sprint 15.pptx
@@ -3062,7 +3062,7 @@
           <a:p>
             <a:fld id="{F58592B6-A757-465A-9A30-9A945E5A7735}" type="datetimeFigureOut">
               <a:rPr lang="en-US" smtClean="0"/>
-              <a:t>6/24/2015</a:t>
+              <a:t>6/25/2015</a:t>
             </a:fld>
             <a:endParaRPr lang="en-US" dirty="0"/>
           </a:p>
@@ -3270,7 +3270,7 @@
           <a:p>
             <a:fld id="{F58592B6-A757-465A-9A30-9A945E5A7735}" type="datetimeFigureOut">
               <a:rPr lang="en-US" smtClean="0"/>
-              <a:t>6/24/2015</a:t>
+              <a:t>6/25/2015</a:t>
             </a:fld>
             <a:endParaRPr lang="en-US" dirty="0"/>
           </a:p>
@@ -8125,8 +8125,9 @@
             <a:pPr lvl="1"/>
             <a:r>
               <a:rPr lang="en-US" dirty="0" smtClean="0"/>
-              <a:t>Release 3 successfully deployed into Production</a:t>
-            </a:r>
+              <a:t>Release 3 ready for Production</a:t>
+            </a:r>
+            <a:endParaRPr lang="en-US" dirty="0" smtClean="0"/>
           </a:p>
           <a:p>
             <a:endParaRPr lang="en-US" dirty="0"/>
@@ -8679,21 +8680,6 @@
 </file>
 
 <file path=customXml/item1.xml><?xml version="1.0" encoding="utf-8"?>
-<p:properties xmlns:p="http://schemas.microsoft.com/office/2006/metadata/properties" xmlns:xsi="http://www.w3.org/2001/XMLSchema-instance" xmlns:pc="http://schemas.microsoft.com/office/infopath/2007/PartnerControls">
-  <documentManagement/>
-</p:properties>
-</file>
-
-<file path=customXml/item2.xml><?xml version="1.0" encoding="utf-8"?>
-<?mso-contentType ?>
-<FormTemplates xmlns="http://schemas.microsoft.com/sharepoint/v3/contenttype/forms">
-  <Display>DocumentLibraryForm</Display>
-  <Edit>DocumentLibraryForm</Edit>
-  <New>DocumentLibraryForm</New>
-</FormTemplates>
-</file>
-
-<file path=customXml/item3.xml><?xml version="1.0" encoding="utf-8"?>
 <ct:contentTypeSchema xmlns:ct="http://schemas.microsoft.com/office/2006/metadata/contentType" xmlns:ma="http://schemas.microsoft.com/office/2006/metadata/properties/metaAttributes" ct:_="" ma:_="" ma:contentTypeName="Document" ma:contentTypeID="0x010100AA5FFAE9E4E7344DACBEF31DEE980884" ma:contentTypeVersion="0" ma:contentTypeDescription="Create a new document." ma:contentTypeScope="" ma:versionID="69f3f84aabe5bcd0f00069aaa4bc7f60">
   <xsd:schema xmlns:xsd="http://www.w3.org/2001/XMLSchema" xmlns:xs="http://www.w3.org/2001/XMLSchema" xmlns:p="http://schemas.microsoft.com/office/2006/metadata/properties" targetNamespace="http://schemas.microsoft.com/office/2006/metadata/properties" ma:root="true" ma:fieldsID="c64490b4aec6201516c3a874156f37b2">
     <xsd:element name="properties">
@@ -8807,17 +8793,33 @@
 </ct:contentTypeSchema>
 </file>
 
+<file path=customXml/item2.xml><?xml version="1.0" encoding="utf-8"?>
+<?mso-contentType ?>
+<FormTemplates xmlns="http://schemas.microsoft.com/sharepoint/v3/contenttype/forms">
+  <Display>DocumentLibraryForm</Display>
+  <Edit>DocumentLibraryForm</Edit>
+  <New>DocumentLibraryForm</New>
+</FormTemplates>
+</file>
+
+<file path=customXml/item3.xml><?xml version="1.0" encoding="utf-8"?>
+<p:properties xmlns:p="http://schemas.microsoft.com/office/2006/metadata/properties" xmlns:xsi="http://www.w3.org/2001/XMLSchema-instance" xmlns:pc="http://schemas.microsoft.com/office/infopath/2007/PartnerControls">
+  <documentManagement/>
+</p:properties>
+</file>
+
 <file path=customXml/itemProps1.xml><?xml version="1.0" encoding="utf-8"?>
-<ds:datastoreItem xmlns:ds="http://schemas.openxmlformats.org/officeDocument/2006/customXml" ds:itemID="{AD0CD7D6-1CCF-4E52-B498-02E49A4C189B}">
+<ds:datastoreItem xmlns:ds="http://schemas.openxmlformats.org/officeDocument/2006/customXml" ds:itemID="{39550D4E-D79C-47C0-B914-0CD23204E957}">
   <ds:schemaRefs>
+    <ds:schemaRef ds:uri="http://schemas.microsoft.com/office/2006/metadata/contentType"/>
+    <ds:schemaRef ds:uri="http://schemas.microsoft.com/office/2006/metadata/properties/metaAttributes"/>
+    <ds:schemaRef ds:uri="http://www.w3.org/2001/XMLSchema"/>
     <ds:schemaRef ds:uri="http://schemas.microsoft.com/office/2006/metadata/properties"/>
-    <ds:schemaRef ds:uri="http://schemas.microsoft.com/office/infopath/2007/PartnerControls"/>
-    <ds:schemaRef ds:uri="http://schemas.microsoft.com/office/2006/documentManagement/types"/>
+    <ds:schemaRef ds:uri="http://schemas.openxmlformats.org/package/2006/metadata/core-properties"/>
     <ds:schemaRef ds:uri="http://purl.org/dc/elements/1.1/"/>
     <ds:schemaRef ds:uri="http://purl.org/dc/terms/"/>
-    <ds:schemaRef ds:uri="http://purl.org/dc/dcmitype/"/>
-    <ds:schemaRef ds:uri="http://schemas.openxmlformats.org/package/2006/metadata/core-properties"/>
-    <ds:schemaRef ds:uri="http://www.w3.org/XML/1998/namespace"/>
+    <ds:schemaRef ds:uri="http://schemas.microsoft.com/internal/obd"/>
+    <ds:schemaRef ds:uri="http://schemas.microsoft.com/office/infopath/2007/PartnerControls"/>
   </ds:schemaRefs>
 </ds:datastoreItem>
 </file>
@@ -8831,17 +8833,16 @@
 </file>
 
 <file path=customXml/itemProps3.xml><?xml version="1.0" encoding="utf-8"?>
-<ds:datastoreItem xmlns:ds="http://schemas.openxmlformats.org/officeDocument/2006/customXml" ds:itemID="{39550D4E-D79C-47C0-B914-0CD23204E957}">
+<ds:datastoreItem xmlns:ds="http://schemas.openxmlformats.org/officeDocument/2006/customXml" ds:itemID="{AD0CD7D6-1CCF-4E52-B498-02E49A4C189B}">
   <ds:schemaRefs>
-    <ds:schemaRef ds:uri="http://schemas.microsoft.com/office/2006/metadata/contentType"/>
-    <ds:schemaRef ds:uri="http://schemas.microsoft.com/office/2006/metadata/properties/metaAttributes"/>
-    <ds:schemaRef ds:uri="http://www.w3.org/2001/XMLSchema"/>
     <ds:schemaRef ds:uri="http://schemas.microsoft.com/office/2006/metadata/properties"/>
-    <ds:schemaRef ds:uri="http://schemas.openxmlformats.org/package/2006/metadata/core-properties"/>
+    <ds:schemaRef ds:uri="http://schemas.microsoft.com/office/infopath/2007/PartnerControls"/>
+    <ds:schemaRef ds:uri="http://schemas.microsoft.com/office/2006/documentManagement/types"/>
     <ds:schemaRef ds:uri="http://purl.org/dc/elements/1.1/"/>
     <ds:schemaRef ds:uri="http://purl.org/dc/terms/"/>
-    <ds:schemaRef ds:uri="http://schemas.microsoft.com/internal/obd"/>
-    <ds:schemaRef ds:uri="http://schemas.microsoft.com/office/infopath/2007/PartnerControls"/>
+    <ds:schemaRef ds:uri="http://purl.org/dc/dcmitype/"/>
+    <ds:schemaRef ds:uri="http://schemas.openxmlformats.org/package/2006/metadata/core-properties"/>
+    <ds:schemaRef ds:uri="http://www.w3.org/XML/1998/namespace"/>
   </ds:schemaRefs>
 </ds:datastoreItem>
 </file>
</xml_diff>